<commit_message>
Finished the Brochure Template
it's finish
</commit_message>
<xml_diff>
--- a/2014 Brochure Template.pptx
+++ b/2014 Brochure Template.pptx
@@ -194,7 +194,7 @@
             <a:fld id="{59F96B8A-DB43-4429-902C-1D9FADF58926}" type="datetimeFigureOut">
               <a:rPr lang="en-US" smtClean="0"/>
               <a:pPr/>
-              <a:t>3/15/2014</a:t>
+              <a:t>3/17/2014</a:t>
             </a:fld>
             <a:endParaRPr lang="en-US"/>
           </a:p>
@@ -724,7 +724,7 @@
             <a:fld id="{095A8D1A-1B86-4C81-87FE-DD1732F8A908}" type="datetimeFigureOut">
               <a:rPr lang="en-US" smtClean="0"/>
               <a:pPr/>
-              <a:t>3/15/2014</a:t>
+              <a:t>3/17/2014</a:t>
             </a:fld>
             <a:endParaRPr lang="en-US"/>
           </a:p>
@@ -891,7 +891,7 @@
             <a:fld id="{095A8D1A-1B86-4C81-87FE-DD1732F8A908}" type="datetimeFigureOut">
               <a:rPr lang="en-US" smtClean="0"/>
               <a:pPr/>
-              <a:t>3/15/2014</a:t>
+              <a:t>3/17/2014</a:t>
             </a:fld>
             <a:endParaRPr lang="en-US"/>
           </a:p>
@@ -1068,7 +1068,7 @@
             <a:fld id="{095A8D1A-1B86-4C81-87FE-DD1732F8A908}" type="datetimeFigureOut">
               <a:rPr lang="en-US" smtClean="0"/>
               <a:pPr/>
-              <a:t>3/15/2014</a:t>
+              <a:t>3/17/2014</a:t>
             </a:fld>
             <a:endParaRPr lang="en-US"/>
           </a:p>
@@ -1235,7 +1235,7 @@
             <a:fld id="{095A8D1A-1B86-4C81-87FE-DD1732F8A908}" type="datetimeFigureOut">
               <a:rPr lang="en-US" smtClean="0"/>
               <a:pPr/>
-              <a:t>3/15/2014</a:t>
+              <a:t>3/17/2014</a:t>
             </a:fld>
             <a:endParaRPr lang="en-US"/>
           </a:p>
@@ -1478,7 +1478,7 @@
             <a:fld id="{095A8D1A-1B86-4C81-87FE-DD1732F8A908}" type="datetimeFigureOut">
               <a:rPr lang="en-US" smtClean="0"/>
               <a:pPr/>
-              <a:t>3/15/2014</a:t>
+              <a:t>3/17/2014</a:t>
             </a:fld>
             <a:endParaRPr lang="en-US"/>
           </a:p>
@@ -1763,7 +1763,7 @@
             <a:fld id="{095A8D1A-1B86-4C81-87FE-DD1732F8A908}" type="datetimeFigureOut">
               <a:rPr lang="en-US" smtClean="0"/>
               <a:pPr/>
-              <a:t>3/15/2014</a:t>
+              <a:t>3/17/2014</a:t>
             </a:fld>
             <a:endParaRPr lang="en-US"/>
           </a:p>
@@ -2182,7 +2182,7 @@
             <a:fld id="{095A8D1A-1B86-4C81-87FE-DD1732F8A908}" type="datetimeFigureOut">
               <a:rPr lang="en-US" smtClean="0"/>
               <a:pPr/>
-              <a:t>3/15/2014</a:t>
+              <a:t>3/17/2014</a:t>
             </a:fld>
             <a:endParaRPr lang="en-US"/>
           </a:p>
@@ -2297,7 +2297,7 @@
             <a:fld id="{095A8D1A-1B86-4C81-87FE-DD1732F8A908}" type="datetimeFigureOut">
               <a:rPr lang="en-US" smtClean="0"/>
               <a:pPr/>
-              <a:t>3/15/2014</a:t>
+              <a:t>3/17/2014</a:t>
             </a:fld>
             <a:endParaRPr lang="en-US"/>
           </a:p>
@@ -2389,7 +2389,7 @@
             <a:fld id="{095A8D1A-1B86-4C81-87FE-DD1732F8A908}" type="datetimeFigureOut">
               <a:rPr lang="en-US" smtClean="0"/>
               <a:pPr/>
-              <a:t>3/15/2014</a:t>
+              <a:t>3/17/2014</a:t>
             </a:fld>
             <a:endParaRPr lang="en-US"/>
           </a:p>
@@ -2663,7 +2663,7 @@
             <a:fld id="{095A8D1A-1B86-4C81-87FE-DD1732F8A908}" type="datetimeFigureOut">
               <a:rPr lang="en-US" smtClean="0"/>
               <a:pPr/>
-              <a:t>3/15/2014</a:t>
+              <a:t>3/17/2014</a:t>
             </a:fld>
             <a:endParaRPr lang="en-US"/>
           </a:p>
@@ -2913,7 +2913,7 @@
             <a:fld id="{095A8D1A-1B86-4C81-87FE-DD1732F8A908}" type="datetimeFigureOut">
               <a:rPr lang="en-US" smtClean="0"/>
               <a:pPr/>
-              <a:t>3/15/2014</a:t>
+              <a:t>3/17/2014</a:t>
             </a:fld>
             <a:endParaRPr lang="en-US"/>
           </a:p>
@@ -3123,7 +3123,7 @@
             <a:fld id="{095A8D1A-1B86-4C81-87FE-DD1732F8A908}" type="datetimeFigureOut">
               <a:rPr lang="en-US" smtClean="0"/>
               <a:pPr/>
-              <a:t>3/15/2014</a:t>
+              <a:t>3/17/2014</a:t>
             </a:fld>
             <a:endParaRPr lang="en-US"/>
           </a:p>
@@ -5549,50 +5549,35 @@
           </a:ln>
         </p:spPr>
       </p:pic>
-      <p:sp>
-        <p:nvSpPr>
-          <p:cNvPr id="12" name="Rounded Rectangle 11"/>
-          <p:cNvSpPr/>
+      <p:pic>
+        <p:nvPicPr>
+          <p:cNvPr id="15" name="Picture 14" descr="IMG_1060.JPG"/>
+          <p:cNvPicPr>
+            <a:picLocks noChangeAspect="1"/>
+          </p:cNvPicPr>
           <p:nvPr/>
-        </p:nvSpPr>
+        </p:nvPicPr>
+        <p:blipFill>
+          <a:blip r:embed="rId7" cstate="print"/>
+          <a:stretch>
+            <a:fillRect/>
+          </a:stretch>
+        </p:blipFill>
         <p:spPr>
           <a:xfrm>
-            <a:off x="7467600" y="3048000"/>
-            <a:ext cx="2057400" cy="1752600"/>
+            <a:off x="7239000" y="3048000"/>
+            <a:ext cx="2362200" cy="3149600"/>
           </a:xfrm>
           <a:prstGeom prst="roundRect">
             <a:avLst/>
           </a:prstGeom>
+          <a:ln w="28575">
+            <a:solidFill>
+              <a:schemeClr val="tx1"/>
+            </a:solidFill>
+          </a:ln>
         </p:spPr>
-        <p:style>
-          <a:lnRef idx="2">
-            <a:schemeClr val="accent1">
-              <a:shade val="50000"/>
-            </a:schemeClr>
-          </a:lnRef>
-          <a:fillRef idx="1">
-            <a:schemeClr val="accent1"/>
-          </a:fillRef>
-          <a:effectRef idx="0">
-            <a:schemeClr val="accent1"/>
-          </a:effectRef>
-          <a:fontRef idx="minor">
-            <a:schemeClr val="lt1"/>
-          </a:fontRef>
-        </p:style>
-        <p:txBody>
-          <a:bodyPr rtlCol="0" anchor="ctr"/>
-          <a:lstStyle/>
-          <a:p>
-            <a:pPr algn="ctr"/>
-            <a:r>
-              <a:rPr lang="en-US" dirty="0" smtClean="0"/>
-              <a:t>Picture</a:t>
-            </a:r>
-            <a:endParaRPr lang="en-US" dirty="0"/>
-          </a:p>
-        </p:txBody>
-      </p:sp>
+      </p:pic>
     </p:spTree>
   </p:cSld>
   <p:clrMapOvr>

</xml_diff>